<commit_message>
add: tutorial 7 and 8
</commit_message>
<xml_diff>
--- a/tutorial/CWATM_exercise8/cwatm_exercise8.pptx
+++ b/tutorial/CWATM_exercise8/cwatm_exercise8.pptx
@@ -5,7 +5,7 @@
     <p:sldMasterId id="2147483660" r:id="rId1"/>
   </p:sldMasterIdLst>
   <p:notesMasterIdLst>
-    <p:notesMasterId r:id="rId17"/>
+    <p:notesMasterId r:id="rId16"/>
   </p:notesMasterIdLst>
   <p:sldIdLst>
     <p:sldId id="257" r:id="rId2"/>
@@ -20,9 +20,8 @@
     <p:sldId id="2581" r:id="rId11"/>
     <p:sldId id="2582" r:id="rId12"/>
     <p:sldId id="2583" r:id="rId13"/>
-    <p:sldId id="2584" r:id="rId14"/>
-    <p:sldId id="2585" r:id="rId15"/>
-    <p:sldId id="2586" r:id="rId16"/>
+    <p:sldId id="2585" r:id="rId14"/>
+    <p:sldId id="2586" r:id="rId15"/>
   </p:sldIdLst>
   <p:sldSz cx="12192000" cy="6858000"/>
   <p:notesSz cx="6858000" cy="9144000"/>
@@ -234,7 +233,7 @@
           <a:p>
             <a:fld id="{EA2D02D5-C0FE-441E-8F91-6CCDB3F0CBDF}" type="datetimeFigureOut">
               <a:rPr lang="en-US" smtClean="0"/>
-              <a:t>14/12/20</a:t>
+              <a:t>15/12/20</a:t>
             </a:fld>
             <a:endParaRPr lang="en-US"/>
           </a:p>
@@ -1071,7 +1070,7 @@
     </p:spTree>
     <p:extLst>
       <p:ext uri="{BB962C8B-B14F-4D97-AF65-F5344CB8AC3E}">
-        <p14:creationId xmlns:p14="http://schemas.microsoft.com/office/powerpoint/2010/main" val="2988501648"/>
+        <p14:creationId xmlns:p14="http://schemas.microsoft.com/office/powerpoint/2010/main" val="1079206157"/>
       </p:ext>
     </p:extLst>
   </p:cSld>
@@ -1168,115 +1167,6 @@
               </a:rPr>
               <a:pPr/>
               <a:t>14</a:t>
-            </a:fld>
-            <a:endParaRPr lang="en-US">
-              <a:solidFill>
-                <a:prstClr val="black"/>
-              </a:solidFill>
-            </a:endParaRPr>
-          </a:p>
-        </p:txBody>
-      </p:sp>
-    </p:spTree>
-    <p:extLst>
-      <p:ext uri="{BB962C8B-B14F-4D97-AF65-F5344CB8AC3E}">
-        <p14:creationId xmlns:p14="http://schemas.microsoft.com/office/powerpoint/2010/main" val="1079206157"/>
-      </p:ext>
-    </p:extLst>
-  </p:cSld>
-  <p:clrMapOvr>
-    <a:masterClrMapping/>
-  </p:clrMapOvr>
-</p:notes>
-</file>
-
-<file path=ppt/notesSlides/notesSlide15.xml><?xml version="1.0" encoding="utf-8"?>
-<p:notes xmlns:a="http://schemas.openxmlformats.org/drawingml/2006/main" xmlns:r="http://schemas.openxmlformats.org/officeDocument/2006/relationships" xmlns:p="http://schemas.openxmlformats.org/presentationml/2006/main">
-  <p:cSld>
-    <p:spTree>
-      <p:nvGrpSpPr>
-        <p:cNvPr id="1" name=""/>
-        <p:cNvGrpSpPr/>
-        <p:nvPr/>
-      </p:nvGrpSpPr>
-      <p:grpSpPr>
-        <a:xfrm>
-          <a:off x="0" y="0"/>
-          <a:ext cx="0" cy="0"/>
-          <a:chOff x="0" y="0"/>
-          <a:chExt cx="0" cy="0"/>
-        </a:xfrm>
-      </p:grpSpPr>
-      <p:sp>
-        <p:nvSpPr>
-          <p:cNvPr id="2" name="Slide Image Placeholder 1"/>
-          <p:cNvSpPr>
-            <a:spLocks noGrp="1" noRot="1" noChangeAspect="1"/>
-          </p:cNvSpPr>
-          <p:nvPr>
-            <p:ph type="sldImg"/>
-          </p:nvPr>
-        </p:nvSpPr>
-        <p:spPr/>
-      </p:sp>
-      <p:sp>
-        <p:nvSpPr>
-          <p:cNvPr id="3" name="Notes Placeholder 2"/>
-          <p:cNvSpPr>
-            <a:spLocks noGrp="1"/>
-          </p:cNvSpPr>
-          <p:nvPr>
-            <p:ph type="body" idx="1"/>
-          </p:nvPr>
-        </p:nvSpPr>
-        <p:spPr/>
-        <p:txBody>
-          <a:bodyPr/>
-          <a:lstStyle/>
-          <a:p>
-            <a:r>
-              <a:rPr lang="en-US" dirty="0"/>
-              <a:t>Improvement</a:t>
-            </a:r>
-            <a:r>
-              <a:rPr lang="en-US" baseline="0" dirty="0"/>
-              <a:t> in resolution of </a:t>
-            </a:r>
-            <a:r>
-              <a:rPr lang="en-US" baseline="0" dirty="0" err="1"/>
-              <a:t>CWatM</a:t>
-            </a:r>
-            <a:r>
-              <a:rPr lang="en-US" baseline="0" dirty="0"/>
-              <a:t> model for basin analysis to show more details locally. </a:t>
-            </a:r>
-            <a:endParaRPr lang="en-US" dirty="0"/>
-          </a:p>
-        </p:txBody>
-      </p:sp>
-      <p:sp>
-        <p:nvSpPr>
-          <p:cNvPr id="4" name="Slide Number Placeholder 3"/>
-          <p:cNvSpPr>
-            <a:spLocks noGrp="1"/>
-          </p:cNvSpPr>
-          <p:nvPr>
-            <p:ph type="sldNum" sz="quarter" idx="10"/>
-          </p:nvPr>
-        </p:nvSpPr>
-        <p:spPr/>
-        <p:txBody>
-          <a:bodyPr/>
-          <a:lstStyle/>
-          <a:p>
-            <a:fld id="{DB2B29A3-1419-4EB2-AE4E-9ED0ED5E3C34}" type="slidenum">
-              <a:rPr lang="en-US" smtClean="0">
-                <a:solidFill>
-                  <a:prstClr val="black"/>
-                </a:solidFill>
-              </a:rPr>
-              <a:pPr/>
-              <a:t>15</a:t>
             </a:fld>
             <a:endParaRPr lang="en-US">
               <a:solidFill>
@@ -4865,7 +4755,7 @@
                 <a:tabLst/>
                 <a:defRPr/>
               </a:pPr>
-              <a:t>14/12/20</a:t>
+              <a:t>15/12/20</a:t>
             </a:fld>
             <a:endParaRPr kumimoji="0" lang="en-US" sz="800" b="0" i="0" u="none" strike="noStrike" kern="1200" cap="none" spc="0" normalizeH="0" baseline="0" noProof="0">
               <a:ln>
@@ -13367,429 +13257,6 @@
       </p:grpSpPr>
       <p:sp>
         <p:nvSpPr>
-          <p:cNvPr id="7" name="Title 6"/>
-          <p:cNvSpPr>
-            <a:spLocks noGrp="1"/>
-          </p:cNvSpPr>
-          <p:nvPr>
-            <p:ph type="title"/>
-          </p:nvPr>
-        </p:nvSpPr>
-        <p:spPr>
-          <a:xfrm>
-            <a:off x="665718" y="842418"/>
-            <a:ext cx="8229600" cy="1143000"/>
-          </a:xfrm>
-        </p:spPr>
-        <p:txBody>
-          <a:bodyPr>
-            <a:normAutofit fontScale="90000"/>
-          </a:bodyPr>
-          <a:lstStyle/>
-          <a:p>
-            <a:r>
-              <a:rPr lang="en-US" sz="3200" b="0" dirty="0">
-                <a:cs typeface="Calibri" panose="020F0502020204030204" pitchFamily="34" charset="0"/>
-              </a:rPr>
-              <a:t>Changing input data </a:t>
-            </a:r>
-            <a:br>
-              <a:rPr lang="en-US" sz="3200" b="0" dirty="0">
-                <a:cs typeface="Calibri" panose="020F0502020204030204" pitchFamily="34" charset="0"/>
-              </a:rPr>
-            </a:br>
-            <a:br>
-              <a:rPr lang="en-US" sz="3200" b="1" dirty="0">
-                <a:cs typeface="Calibri" panose="020F0502020204030204" pitchFamily="34" charset="0"/>
-              </a:rPr>
-            </a:br>
-            <a:br>
-              <a:rPr lang="en-US" sz="3200" b="1" dirty="0">
-                <a:cs typeface="Calibri" panose="020F0502020204030204" pitchFamily="34" charset="0"/>
-              </a:rPr>
-            </a:br>
-            <a:br>
-              <a:rPr lang="en-US" b="1" dirty="0">
-                <a:solidFill>
-                  <a:sysClr val="windowText" lastClr="000000"/>
-                </a:solidFill>
-              </a:rPr>
-            </a:br>
-            <a:endParaRPr lang="en-US" dirty="0"/>
-          </a:p>
-        </p:txBody>
-      </p:sp>
-      <p:sp>
-        <p:nvSpPr>
-          <p:cNvPr id="3" name="Determine the impact of different policies on the future behavior of some real system…">
-            <a:extLst>
-              <a:ext uri="{FF2B5EF4-FFF2-40B4-BE49-F238E27FC236}">
-                <a16:creationId xmlns:a16="http://schemas.microsoft.com/office/drawing/2014/main" id="{33677E76-ECF5-4F7D-B13A-F372C3169ACE}"/>
-              </a:ext>
-            </a:extLst>
-          </p:cNvPr>
-          <p:cNvSpPr txBox="1">
-            <a:spLocks/>
-          </p:cNvSpPr>
-          <p:nvPr/>
-        </p:nvSpPr>
-        <p:spPr>
-          <a:xfrm>
-            <a:off x="761513" y="842418"/>
-            <a:ext cx="11012475" cy="4334769"/>
-          </a:xfrm>
-          <a:prstGeom prst="rect">
-            <a:avLst/>
-          </a:prstGeom>
-        </p:spPr>
-        <p:txBody>
-          <a:bodyPr vert="horz" lIns="91440" tIns="45720" rIns="91440" bIns="45720" rtlCol="0">
-            <a:normAutofit/>
-          </a:bodyPr>
-          <a:lstStyle>
-            <a:lvl1pPr marL="228600" indent="-228600" algn="l" defTabSz="914400" rtl="0" eaLnBrk="1" latinLnBrk="0" hangingPunct="1">
-              <a:lnSpc>
-                <a:spcPct val="90000"/>
-              </a:lnSpc>
-              <a:spcBef>
-                <a:spcPts val="1000"/>
-              </a:spcBef>
-              <a:buFont typeface="Arial" panose="020B0604020202020204" pitchFamily="34" charset="0"/>
-              <a:buChar char="•"/>
-              <a:defRPr sz="2800" kern="1200">
-                <a:solidFill>
-                  <a:schemeClr val="tx1"/>
-                </a:solidFill>
-                <a:latin typeface="Tahoma" panose="020B0604030504040204" pitchFamily="34" charset="0"/>
-                <a:ea typeface="Tahoma" panose="020B0604030504040204" pitchFamily="34" charset="0"/>
-                <a:cs typeface="Tahoma" panose="020B0604030504040204" pitchFamily="34" charset="0"/>
-              </a:defRPr>
-            </a:lvl1pPr>
-            <a:lvl2pPr marL="685800" indent="-228600" algn="l" defTabSz="914400" rtl="0" eaLnBrk="1" latinLnBrk="0" hangingPunct="1">
-              <a:lnSpc>
-                <a:spcPct val="90000"/>
-              </a:lnSpc>
-              <a:spcBef>
-                <a:spcPts val="500"/>
-              </a:spcBef>
-              <a:buFont typeface="Arial" panose="020B0604020202020204" pitchFamily="34" charset="0"/>
-              <a:buChar char="•"/>
-              <a:defRPr sz="2400" b="0" kern="1200">
-                <a:solidFill>
-                  <a:schemeClr val="tx1"/>
-                </a:solidFill>
-                <a:latin typeface="Tahoma" panose="020B0604030504040204" pitchFamily="34" charset="0"/>
-                <a:ea typeface="Tahoma" panose="020B0604030504040204" pitchFamily="34" charset="0"/>
-                <a:cs typeface="Tahoma" panose="020B0604030504040204" pitchFamily="34" charset="0"/>
-              </a:defRPr>
-            </a:lvl2pPr>
-            <a:lvl3pPr marL="1143000" indent="-228600" algn="l" defTabSz="914400" rtl="0" eaLnBrk="1" latinLnBrk="0" hangingPunct="1">
-              <a:lnSpc>
-                <a:spcPct val="90000"/>
-              </a:lnSpc>
-              <a:spcBef>
-                <a:spcPts val="500"/>
-              </a:spcBef>
-              <a:buFont typeface="Arial" panose="020B0604020202020204" pitchFamily="34" charset="0"/>
-              <a:buChar char="•"/>
-              <a:defRPr sz="2000" kern="1200">
-                <a:solidFill>
-                  <a:schemeClr val="tx1"/>
-                </a:solidFill>
-                <a:latin typeface="Tahoma" panose="020B0604030504040204" pitchFamily="34" charset="0"/>
-                <a:ea typeface="Tahoma" panose="020B0604030504040204" pitchFamily="34" charset="0"/>
-                <a:cs typeface="Tahoma" panose="020B0604030504040204" pitchFamily="34" charset="0"/>
-              </a:defRPr>
-            </a:lvl3pPr>
-            <a:lvl4pPr marL="1600200" indent="-228600" algn="l" defTabSz="914400" rtl="0" eaLnBrk="1" latinLnBrk="0" hangingPunct="1">
-              <a:lnSpc>
-                <a:spcPct val="90000"/>
-              </a:lnSpc>
-              <a:spcBef>
-                <a:spcPts val="500"/>
-              </a:spcBef>
-              <a:buFont typeface="Arial" panose="020B0604020202020204" pitchFamily="34" charset="0"/>
-              <a:buChar char="•"/>
-              <a:defRPr sz="1800" kern="1200">
-                <a:solidFill>
-                  <a:schemeClr val="tx1"/>
-                </a:solidFill>
-                <a:latin typeface="Tahoma" panose="020B0604030504040204" pitchFamily="34" charset="0"/>
-                <a:ea typeface="Tahoma" panose="020B0604030504040204" pitchFamily="34" charset="0"/>
-                <a:cs typeface="Tahoma" panose="020B0604030504040204" pitchFamily="34" charset="0"/>
-              </a:defRPr>
-            </a:lvl4pPr>
-            <a:lvl5pPr marL="2057400" indent="-228600" algn="l" defTabSz="914400" rtl="0" eaLnBrk="1" latinLnBrk="0" hangingPunct="1">
-              <a:lnSpc>
-                <a:spcPct val="90000"/>
-              </a:lnSpc>
-              <a:spcBef>
-                <a:spcPts val="500"/>
-              </a:spcBef>
-              <a:buFont typeface="Arial" panose="020B0604020202020204" pitchFamily="34" charset="0"/>
-              <a:buChar char="•"/>
-              <a:defRPr sz="1800" kern="1200">
-                <a:solidFill>
-                  <a:schemeClr val="tx1"/>
-                </a:solidFill>
-                <a:latin typeface="Tahoma" panose="020B0604030504040204" pitchFamily="34" charset="0"/>
-                <a:ea typeface="Tahoma" panose="020B0604030504040204" pitchFamily="34" charset="0"/>
-                <a:cs typeface="Tahoma" panose="020B0604030504040204" pitchFamily="34" charset="0"/>
-              </a:defRPr>
-            </a:lvl5pPr>
-            <a:lvl6pPr marL="2514600" indent="-228600" algn="l" defTabSz="914400" rtl="0" eaLnBrk="1" latinLnBrk="0" hangingPunct="1">
-              <a:lnSpc>
-                <a:spcPct val="90000"/>
-              </a:lnSpc>
-              <a:spcBef>
-                <a:spcPts val="500"/>
-              </a:spcBef>
-              <a:buFont typeface="Arial" panose="020B0604020202020204" pitchFamily="34" charset="0"/>
-              <a:buChar char="•"/>
-              <a:defRPr sz="1800" kern="1200">
-                <a:solidFill>
-                  <a:schemeClr val="tx1"/>
-                </a:solidFill>
-                <a:latin typeface="+mn-lt"/>
-                <a:ea typeface="+mn-ea"/>
-                <a:cs typeface="+mn-cs"/>
-              </a:defRPr>
-            </a:lvl6pPr>
-            <a:lvl7pPr marL="2971800" indent="-228600" algn="l" defTabSz="914400" rtl="0" eaLnBrk="1" latinLnBrk="0" hangingPunct="1">
-              <a:lnSpc>
-                <a:spcPct val="90000"/>
-              </a:lnSpc>
-              <a:spcBef>
-                <a:spcPts val="500"/>
-              </a:spcBef>
-              <a:buFont typeface="Arial" panose="020B0604020202020204" pitchFamily="34" charset="0"/>
-              <a:buChar char="•"/>
-              <a:defRPr sz="1800" kern="1200">
-                <a:solidFill>
-                  <a:schemeClr val="tx1"/>
-                </a:solidFill>
-                <a:latin typeface="+mn-lt"/>
-                <a:ea typeface="+mn-ea"/>
-                <a:cs typeface="+mn-cs"/>
-              </a:defRPr>
-            </a:lvl7pPr>
-            <a:lvl8pPr marL="3429000" indent="-228600" algn="l" defTabSz="914400" rtl="0" eaLnBrk="1" latinLnBrk="0" hangingPunct="1">
-              <a:lnSpc>
-                <a:spcPct val="90000"/>
-              </a:lnSpc>
-              <a:spcBef>
-                <a:spcPts val="500"/>
-              </a:spcBef>
-              <a:buFont typeface="Arial" panose="020B0604020202020204" pitchFamily="34" charset="0"/>
-              <a:buChar char="•"/>
-              <a:defRPr sz="1800" kern="1200">
-                <a:solidFill>
-                  <a:schemeClr val="tx1"/>
-                </a:solidFill>
-                <a:latin typeface="+mn-lt"/>
-                <a:ea typeface="+mn-ea"/>
-                <a:cs typeface="+mn-cs"/>
-              </a:defRPr>
-            </a:lvl8pPr>
-            <a:lvl9pPr marL="3886200" indent="-228600" algn="l" defTabSz="914400" rtl="0" eaLnBrk="1" latinLnBrk="0" hangingPunct="1">
-              <a:lnSpc>
-                <a:spcPct val="90000"/>
-              </a:lnSpc>
-              <a:spcBef>
-                <a:spcPts val="500"/>
-              </a:spcBef>
-              <a:buFont typeface="Arial" panose="020B0604020202020204" pitchFamily="34" charset="0"/>
-              <a:buChar char="•"/>
-              <a:defRPr sz="1800" kern="1200">
-                <a:solidFill>
-                  <a:schemeClr val="tx1"/>
-                </a:solidFill>
-                <a:latin typeface="+mn-lt"/>
-                <a:ea typeface="+mn-ea"/>
-                <a:cs typeface="+mn-cs"/>
-              </a:defRPr>
-            </a:lvl9pPr>
-          </a:lstStyle>
-          <a:p>
-            <a:pPr marL="0" indent="0" defTabSz="457200">
-              <a:lnSpc>
-                <a:spcPct val="150000"/>
-              </a:lnSpc>
-              <a:spcBef>
-                <a:spcPts val="600"/>
-              </a:spcBef>
-              <a:buNone/>
-              <a:defRPr sz="2800"/>
-            </a:pPr>
-            <a:r>
-              <a:rPr lang="en-US" dirty="0"/>
-              <a:t>Run </a:t>
-            </a:r>
-            <a:r>
-              <a:rPr lang="en-US" dirty="0" err="1"/>
-              <a:t>CWatM</a:t>
-            </a:r>
-            <a:r>
-              <a:rPr lang="en-US" dirty="0"/>
-              <a:t> twice to see the difference</a:t>
-            </a:r>
-          </a:p>
-          <a:p>
-            <a:pPr defTabSz="457200">
-              <a:lnSpc>
-                <a:spcPct val="100000"/>
-              </a:lnSpc>
-              <a:spcBef>
-                <a:spcPts val="600"/>
-              </a:spcBef>
-              <a:buFontTx/>
-              <a:buChar char="-"/>
-              <a:defRPr sz="2800"/>
-            </a:pPr>
-            <a:r>
-              <a:rPr lang="en-US" dirty="0"/>
-              <a:t>Run 01_python_example.bat</a:t>
-            </a:r>
-          </a:p>
-          <a:p>
-            <a:pPr marL="0" indent="0" defTabSz="457200">
-              <a:lnSpc>
-                <a:spcPct val="100000"/>
-              </a:lnSpc>
-              <a:spcBef>
-                <a:spcPts val="600"/>
-              </a:spcBef>
-              <a:buNone/>
-              <a:defRPr sz="2800"/>
-            </a:pPr>
-            <a:r>
-              <a:rPr lang="en-US" dirty="0"/>
-              <a:t>   or </a:t>
-            </a:r>
-            <a:r>
-              <a:rPr lang="en-US" sz="2000" dirty="0"/>
-              <a:t>python ../CWATM_model/CWatM/run_cwatm.py settings_rhine30min1.ini -l</a:t>
-            </a:r>
-          </a:p>
-          <a:p>
-            <a:pPr defTabSz="457200">
-              <a:lnSpc>
-                <a:spcPct val="100000"/>
-              </a:lnSpc>
-              <a:spcBef>
-                <a:spcPts val="600"/>
-              </a:spcBef>
-              <a:buFontTx/>
-              <a:buChar char="-"/>
-              <a:defRPr sz="2800"/>
-            </a:pPr>
-            <a:r>
-              <a:rPr lang="en-US" dirty="0"/>
-              <a:t>Output in output1</a:t>
-            </a:r>
-          </a:p>
-          <a:p>
-            <a:pPr defTabSz="457200">
-              <a:lnSpc>
-                <a:spcPct val="100000"/>
-              </a:lnSpc>
-              <a:spcBef>
-                <a:spcPts val="600"/>
-              </a:spcBef>
-              <a:buFontTx/>
-              <a:buChar char="-"/>
-              <a:defRPr sz="2800"/>
-            </a:pPr>
-            <a:endParaRPr lang="en-US" dirty="0"/>
-          </a:p>
-          <a:p>
-            <a:pPr defTabSz="457200">
-              <a:lnSpc>
-                <a:spcPct val="100000"/>
-              </a:lnSpc>
-              <a:spcBef>
-                <a:spcPts val="600"/>
-              </a:spcBef>
-              <a:buFontTx/>
-              <a:buChar char="-"/>
-              <a:defRPr sz="2800"/>
-            </a:pPr>
-            <a:r>
-              <a:rPr lang="en-US" dirty="0"/>
-              <a:t>Run 02_python_example.bat</a:t>
-            </a:r>
-          </a:p>
-          <a:p>
-            <a:pPr marL="0" indent="0" defTabSz="457200">
-              <a:lnSpc>
-                <a:spcPct val="100000"/>
-              </a:lnSpc>
-              <a:spcBef>
-                <a:spcPts val="600"/>
-              </a:spcBef>
-              <a:buNone/>
-              <a:defRPr sz="2800"/>
-            </a:pPr>
-            <a:r>
-              <a:rPr lang="en-US" dirty="0"/>
-              <a:t>   or </a:t>
-            </a:r>
-            <a:r>
-              <a:rPr lang="en-US" sz="2000" dirty="0"/>
-              <a:t>python ../CWATM_model/CWatM/run_cwatm.py settings_rhine30min2.ini -l</a:t>
-            </a:r>
-          </a:p>
-          <a:p>
-            <a:pPr defTabSz="457200">
-              <a:lnSpc>
-                <a:spcPct val="100000"/>
-              </a:lnSpc>
-              <a:spcBef>
-                <a:spcPts val="600"/>
-              </a:spcBef>
-              <a:buFontTx/>
-              <a:buChar char="-"/>
-              <a:defRPr sz="2800"/>
-            </a:pPr>
-            <a:r>
-              <a:rPr lang="en-US" dirty="0"/>
-              <a:t>Output in output2</a:t>
-            </a:r>
-          </a:p>
-        </p:txBody>
-      </p:sp>
-    </p:spTree>
-    <p:extLst>
-      <p:ext uri="{BB962C8B-B14F-4D97-AF65-F5344CB8AC3E}">
-        <p14:creationId xmlns:p14="http://schemas.microsoft.com/office/powerpoint/2010/main" val="2041493097"/>
-      </p:ext>
-    </p:extLst>
-  </p:cSld>
-  <p:clrMapOvr>
-    <a:masterClrMapping/>
-  </p:clrMapOvr>
-</p:sld>
-</file>
-
-<file path=ppt/slides/slide14.xml><?xml version="1.0" encoding="utf-8"?>
-<p:sld xmlns:a="http://schemas.openxmlformats.org/drawingml/2006/main" xmlns:r="http://schemas.openxmlformats.org/officeDocument/2006/relationships" xmlns:p="http://schemas.openxmlformats.org/presentationml/2006/main">
-  <p:cSld>
-    <p:spTree>
-      <p:nvGrpSpPr>
-        <p:cNvPr id="1" name=""/>
-        <p:cNvGrpSpPr/>
-        <p:nvPr/>
-      </p:nvGrpSpPr>
-      <p:grpSpPr>
-        <a:xfrm>
-          <a:off x="0" y="0"/>
-          <a:ext cx="0" cy="0"/>
-          <a:chOff x="0" y="0"/>
-          <a:chExt cx="0" cy="0"/>
-        </a:xfrm>
-      </p:grpSpPr>
-      <p:sp>
-        <p:nvSpPr>
           <p:cNvPr id="9" name="Rectangle 8">
             <a:extLst>
               <a:ext uri="{FF2B5EF4-FFF2-40B4-BE49-F238E27FC236}">
@@ -14123,7 +13590,7 @@
             </a:pPr>
             <a:r>
               <a:rPr lang="en-US" dirty="0"/>
-              <a:t>Run 01_python_example.bat</a:t>
+              <a:t>Run 81_python_example.bat</a:t>
             </a:r>
           </a:p>
           <a:p>
@@ -14191,7 +13658,7 @@
             </a:pPr>
             <a:r>
               <a:rPr lang="en-US" dirty="0"/>
-              <a:t>Run 02_python_example.bat</a:t>
+              <a:t>Run 82_python_example.bat</a:t>
             </a:r>
           </a:p>
           <a:p>
@@ -14346,7 +13813,7 @@
 </p:sld>
 </file>
 
-<file path=ppt/slides/slide15.xml><?xml version="1.0" encoding="utf-8"?>
+<file path=ppt/slides/slide14.xml><?xml version="1.0" encoding="utf-8"?>
 <p:sld xmlns:a="http://schemas.openxmlformats.org/drawingml/2006/main" xmlns:r="http://schemas.openxmlformats.org/officeDocument/2006/relationships" xmlns:p="http://schemas.openxmlformats.org/presentationml/2006/main">
   <p:cSld>
     <p:spTree>

</xml_diff>